<commit_message>
add more configurations (#3)
</commit_message>
<xml_diff>
--- a/static analysis.pptx
+++ b/static analysis.pptx
@@ -7,6 +7,11 @@
   <p:sldIdLst>
     <p:sldId id="256" r:id="rId2"/>
     <p:sldId id="257" r:id="rId3"/>
+    <p:sldId id="259" r:id="rId4"/>
+    <p:sldId id="262" r:id="rId5"/>
+    <p:sldId id="258" r:id="rId6"/>
+    <p:sldId id="260" r:id="rId7"/>
+    <p:sldId id="261" r:id="rId8"/>
   </p:sldIdLst>
   <p:sldSz cx="12192000" cy="6858000"/>
   <p:notesSz cx="6858000" cy="9144000"/>
@@ -105,6 +110,11 @@
       </a:defRPr>
     </a:lvl9pPr>
   </p:defaultTextStyle>
+  <p:extLst>
+    <p:ext uri="{EFAFB233-063F-42B5-8137-9DF3F51BA10A}">
+      <p15:sldGuideLst xmlns:p15="http://schemas.microsoft.com/office/powerpoint/2012/main"/>
+    </p:ext>
+  </p:extLst>
 </p:presentation>
 </file>
 
@@ -257,7 +267,7 @@
           <a:p>
             <a:fld id="{E8B54E0F-B7D6-41EF-AEA7-8D7CDD1FB199}" type="datetimeFigureOut">
               <a:rPr lang="es-CO" smtClean="0"/>
-              <a:t>13/09/2023</a:t>
+              <a:t>15/09/2023</a:t>
             </a:fld>
             <a:endParaRPr lang="es-CO"/>
           </a:p>
@@ -457,7 +467,7 @@
           <a:p>
             <a:fld id="{E8B54E0F-B7D6-41EF-AEA7-8D7CDD1FB199}" type="datetimeFigureOut">
               <a:rPr lang="es-CO" smtClean="0"/>
-              <a:t>13/09/2023</a:t>
+              <a:t>15/09/2023</a:t>
             </a:fld>
             <a:endParaRPr lang="es-CO"/>
           </a:p>
@@ -667,7 +677,7 @@
           <a:p>
             <a:fld id="{E8B54E0F-B7D6-41EF-AEA7-8D7CDD1FB199}" type="datetimeFigureOut">
               <a:rPr lang="es-CO" smtClean="0"/>
-              <a:t>13/09/2023</a:t>
+              <a:t>15/09/2023</a:t>
             </a:fld>
             <a:endParaRPr lang="es-CO"/>
           </a:p>
@@ -867,7 +877,7 @@
           <a:p>
             <a:fld id="{E8B54E0F-B7D6-41EF-AEA7-8D7CDD1FB199}" type="datetimeFigureOut">
               <a:rPr lang="es-CO" smtClean="0"/>
-              <a:t>13/09/2023</a:t>
+              <a:t>15/09/2023</a:t>
             </a:fld>
             <a:endParaRPr lang="es-CO"/>
           </a:p>
@@ -1143,7 +1153,7 @@
           <a:p>
             <a:fld id="{E8B54E0F-B7D6-41EF-AEA7-8D7CDD1FB199}" type="datetimeFigureOut">
               <a:rPr lang="es-CO" smtClean="0"/>
-              <a:t>13/09/2023</a:t>
+              <a:t>15/09/2023</a:t>
             </a:fld>
             <a:endParaRPr lang="es-CO"/>
           </a:p>
@@ -1411,7 +1421,7 @@
           <a:p>
             <a:fld id="{E8B54E0F-B7D6-41EF-AEA7-8D7CDD1FB199}" type="datetimeFigureOut">
               <a:rPr lang="es-CO" smtClean="0"/>
-              <a:t>13/09/2023</a:t>
+              <a:t>15/09/2023</a:t>
             </a:fld>
             <a:endParaRPr lang="es-CO"/>
           </a:p>
@@ -1826,7 +1836,7 @@
           <a:p>
             <a:fld id="{E8B54E0F-B7D6-41EF-AEA7-8D7CDD1FB199}" type="datetimeFigureOut">
               <a:rPr lang="es-CO" smtClean="0"/>
-              <a:t>13/09/2023</a:t>
+              <a:t>15/09/2023</a:t>
             </a:fld>
             <a:endParaRPr lang="es-CO"/>
           </a:p>
@@ -1968,7 +1978,7 @@
           <a:p>
             <a:fld id="{E8B54E0F-B7D6-41EF-AEA7-8D7CDD1FB199}" type="datetimeFigureOut">
               <a:rPr lang="es-CO" smtClean="0"/>
-              <a:t>13/09/2023</a:t>
+              <a:t>15/09/2023</a:t>
             </a:fld>
             <a:endParaRPr lang="es-CO"/>
           </a:p>
@@ -2081,7 +2091,7 @@
           <a:p>
             <a:fld id="{E8B54E0F-B7D6-41EF-AEA7-8D7CDD1FB199}" type="datetimeFigureOut">
               <a:rPr lang="es-CO" smtClean="0"/>
-              <a:t>13/09/2023</a:t>
+              <a:t>15/09/2023</a:t>
             </a:fld>
             <a:endParaRPr lang="es-CO"/>
           </a:p>
@@ -2394,7 +2404,7 @@
           <a:p>
             <a:fld id="{E8B54E0F-B7D6-41EF-AEA7-8D7CDD1FB199}" type="datetimeFigureOut">
               <a:rPr lang="es-CO" smtClean="0"/>
-              <a:t>13/09/2023</a:t>
+              <a:t>15/09/2023</a:t>
             </a:fld>
             <a:endParaRPr lang="es-CO"/>
           </a:p>
@@ -2683,7 +2693,7 @@
           <a:p>
             <a:fld id="{E8B54E0F-B7D6-41EF-AEA7-8D7CDD1FB199}" type="datetimeFigureOut">
               <a:rPr lang="es-CO" smtClean="0"/>
-              <a:t>13/09/2023</a:t>
+              <a:t>15/09/2023</a:t>
             </a:fld>
             <a:endParaRPr lang="es-CO"/>
           </a:p>
@@ -2926,7 +2936,7 @@
           <a:p>
             <a:fld id="{E8B54E0F-B7D6-41EF-AEA7-8D7CDD1FB199}" type="datetimeFigureOut">
               <a:rPr lang="es-CO" smtClean="0"/>
-              <a:t>13/09/2023</a:t>
+              <a:t>15/09/2023</a:t>
             </a:fld>
             <a:endParaRPr lang="es-CO"/>
           </a:p>
@@ -3366,7 +3376,7 @@
           <a:p>
             <a:r>
               <a:rPr lang="es-CO" dirty="0" err="1"/>
-              <a:t>static</a:t>
+              <a:t>Static</a:t>
             </a:r>
             <a:r>
               <a:rPr lang="es-CO" dirty="0"/>
@@ -3374,9 +3384,20 @@
             </a:r>
             <a:r>
               <a:rPr lang="es-CO" dirty="0" err="1"/>
-              <a:t>analysis</a:t>
-            </a:r>
-            <a:endParaRPr lang="es-CO" dirty="0"/>
+              <a:t>Analysis</a:t>
+            </a:r>
+            <a:r>
+              <a:rPr lang="es-CO" dirty="0"/>
+              <a:t> </a:t>
+            </a:r>
+            <a:r>
+              <a:rPr lang="es-CO" dirty="0" err="1"/>
+              <a:t>with</a:t>
+            </a:r>
+            <a:r>
+              <a:rPr lang="es-CO" dirty="0"/>
+              <a:t> Sonar</a:t>
+            </a:r>
           </a:p>
         </p:txBody>
       </p:sp>
@@ -3398,8 +3419,16 @@
         </p:nvSpPr>
         <p:spPr/>
         <p:txBody>
-          <a:bodyPr/>
-          <a:lstStyle/>
+          <a:bodyPr>
+            <a:normAutofit/>
+          </a:bodyPr>
+          <a:lstStyle/>
+          <a:p>
+            <a:r>
+              <a:rPr lang="en-US" dirty="0"/>
+              <a:t>Keywords: Clean Code, Vulnerability, Bug, Security Hotspot, Code Smell</a:t>
+            </a:r>
+          </a:p>
           <a:p>
             <a:endParaRPr lang="es-CO" dirty="0"/>
           </a:p>
@@ -3457,19 +3486,66 @@
           <a:lstStyle/>
           <a:p>
             <a:r>
-              <a:rPr lang="en-US"/>
-              <a:t>Sonarqube</a:t>
+              <a:rPr lang="en-US" dirty="0"/>
+              <a:t>Sonar</a:t>
             </a:r>
             <a:endParaRPr lang="es-CO" dirty="0"/>
           </a:p>
         </p:txBody>
       </p:sp>
-      <p:sp>
-        <p:nvSpPr>
-          <p:cNvPr id="3" name="Marcador de contenido 2">
-            <a:extLst>
-              <a:ext uri="{FF2B5EF4-FFF2-40B4-BE49-F238E27FC236}">
-                <a16:creationId xmlns:a16="http://schemas.microsoft.com/office/drawing/2014/main" id="{39DF0361-060E-539C-D5B1-4DA0579D98EE}"/>
+      <p:pic>
+        <p:nvPicPr>
+          <p:cNvPr id="1028" name="Picture 4" descr="SQ instance components">
+            <a:extLst>
+              <a:ext uri="{FF2B5EF4-FFF2-40B4-BE49-F238E27FC236}">
+                <a16:creationId xmlns:a16="http://schemas.microsoft.com/office/drawing/2014/main" id="{38AC139B-BA82-FD2B-E948-8A8D33C8B48F}"/>
+              </a:ext>
+            </a:extLst>
+          </p:cNvPr>
+          <p:cNvPicPr>
+            <a:picLocks noChangeAspect="1" noChangeArrowheads="1"/>
+          </p:cNvPicPr>
+          <p:nvPr/>
+        </p:nvPicPr>
+        <p:blipFill>
+          <a:blip r:embed="rId2">
+            <a:extLst>
+              <a:ext uri="{28A0092B-C50C-407E-A947-70E740481C1C}">
+                <a14:useLocalDpi xmlns:a14="http://schemas.microsoft.com/office/drawing/2010/main" val="0"/>
+              </a:ext>
+            </a:extLst>
+          </a:blip>
+          <a:srcRect/>
+          <a:stretch>
+            <a:fillRect/>
+          </a:stretch>
+        </p:blipFill>
+        <p:spPr bwMode="auto">
+          <a:xfrm>
+            <a:off x="2719755" y="2819048"/>
+            <a:ext cx="6218644" cy="3035290"/>
+          </a:xfrm>
+          <a:prstGeom prst="rect">
+            <a:avLst/>
+          </a:prstGeom>
+          <a:noFill/>
+          <a:extLst>
+            <a:ext uri="{909E8E84-426E-40DD-AFC4-6F175D3DCCD1}">
+              <a14:hiddenFill xmlns:a14="http://schemas.microsoft.com/office/drawing/2010/main">
+                <a:solidFill>
+                  <a:srgbClr val="FFFFFF"/>
+                </a:solidFill>
+              </a14:hiddenFill>
+            </a:ext>
+          </a:extLst>
+        </p:spPr>
+      </p:pic>
+      <p:sp>
+        <p:nvSpPr>
+          <p:cNvPr id="6" name="Marcador de contenido 2">
+            <a:extLst>
+              <a:ext uri="{FF2B5EF4-FFF2-40B4-BE49-F238E27FC236}">
+                <a16:creationId xmlns:a16="http://schemas.microsoft.com/office/drawing/2014/main" id="{AA1A372C-43D0-21EA-AA66-249E0803C9DC}"/>
               </a:ext>
             </a:extLst>
           </p:cNvPr>
@@ -3480,20 +3556,24 @@
             <p:ph idx="1"/>
           </p:nvPr>
         </p:nvSpPr>
-        <p:spPr/>
-        <p:txBody>
-          <a:bodyPr/>
-          <a:lstStyle/>
-          <a:p>
+        <p:spPr>
+          <a:xfrm>
+            <a:off x="838200" y="1825625"/>
+            <a:ext cx="10143392" cy="759313"/>
+          </a:xfrm>
+        </p:spPr>
+        <p:txBody>
+          <a:bodyPr>
+            <a:normAutofit fontScale="92500"/>
+          </a:bodyPr>
+          <a:lstStyle/>
+          <a:p>
+            <a:pPr marL="0" indent="0">
+              <a:buNone/>
+            </a:pPr>
             <a:r>
               <a:rPr lang="en-US" dirty="0"/>
-              <a:t>Server</a:t>
-            </a:r>
-          </a:p>
-          <a:p>
-            <a:r>
-              <a:rPr lang="en-US" dirty="0"/>
-              <a:t>Scanner</a:t>
+              <a:t>Sonar consists of a Scanner and a Web application (self-hosted or SaaS).</a:t>
             </a:r>
             <a:endParaRPr lang="es-CO" dirty="0"/>
           </a:p>
@@ -3503,6 +3583,914 @@
     <p:extLst>
       <p:ext uri="{BB962C8B-B14F-4D97-AF65-F5344CB8AC3E}">
         <p14:creationId xmlns:p14="http://schemas.microsoft.com/office/powerpoint/2010/main" val="3699067159"/>
+      </p:ext>
+    </p:extLst>
+  </p:cSld>
+  <p:clrMapOvr>
+    <a:masterClrMapping/>
+  </p:clrMapOvr>
+</p:sld>
+</file>
+
+<file path=ppt/slides/slide3.xml><?xml version="1.0" encoding="utf-8"?>
+<p:sld xmlns:a="http://schemas.openxmlformats.org/drawingml/2006/main" xmlns:r="http://schemas.openxmlformats.org/officeDocument/2006/relationships" xmlns:p="http://schemas.openxmlformats.org/presentationml/2006/main">
+  <p:cSld>
+    <p:spTree>
+      <p:nvGrpSpPr>
+        <p:cNvPr id="1" name=""/>
+        <p:cNvGrpSpPr/>
+        <p:nvPr/>
+      </p:nvGrpSpPr>
+      <p:grpSpPr>
+        <a:xfrm>
+          <a:off x="0" y="0"/>
+          <a:ext cx="0" cy="0"/>
+          <a:chOff x="0" y="0"/>
+          <a:chExt cx="0" cy="0"/>
+        </a:xfrm>
+      </p:grpSpPr>
+      <p:sp>
+        <p:nvSpPr>
+          <p:cNvPr id="2" name="Título 1">
+            <a:extLst>
+              <a:ext uri="{FF2B5EF4-FFF2-40B4-BE49-F238E27FC236}">
+                <a16:creationId xmlns:a16="http://schemas.microsoft.com/office/drawing/2014/main" id="{D395A6BF-2F47-F5A3-7FE2-8B38198BC74A}"/>
+              </a:ext>
+            </a:extLst>
+          </p:cNvPr>
+          <p:cNvSpPr>
+            <a:spLocks noGrp="1"/>
+          </p:cNvSpPr>
+          <p:nvPr>
+            <p:ph type="title"/>
+          </p:nvPr>
+        </p:nvSpPr>
+        <p:spPr/>
+        <p:txBody>
+          <a:bodyPr/>
+          <a:lstStyle/>
+          <a:p>
+            <a:r>
+              <a:rPr lang="en-US" dirty="0"/>
+              <a:t>Where can I configure Sonar?</a:t>
+            </a:r>
+            <a:endParaRPr lang="es-CO" dirty="0"/>
+          </a:p>
+        </p:txBody>
+      </p:sp>
+      <p:sp>
+        <p:nvSpPr>
+          <p:cNvPr id="3" name="Marcador de contenido 2">
+            <a:extLst>
+              <a:ext uri="{FF2B5EF4-FFF2-40B4-BE49-F238E27FC236}">
+                <a16:creationId xmlns:a16="http://schemas.microsoft.com/office/drawing/2014/main" id="{23FFBA63-1C94-5A9B-5511-4B3BE5D1462C}"/>
+              </a:ext>
+            </a:extLst>
+          </p:cNvPr>
+          <p:cNvSpPr>
+            <a:spLocks noGrp="1"/>
+          </p:cNvSpPr>
+          <p:nvPr>
+            <p:ph idx="1"/>
+          </p:nvPr>
+        </p:nvSpPr>
+        <p:spPr/>
+        <p:txBody>
+          <a:bodyPr/>
+          <a:lstStyle/>
+          <a:p>
+            <a:pPr marL="0" indent="0">
+              <a:buNone/>
+            </a:pPr>
+            <a:endParaRPr lang="en-US" dirty="0"/>
+          </a:p>
+          <a:p>
+            <a:pPr marL="0" indent="0">
+              <a:buNone/>
+            </a:pPr>
+            <a:endParaRPr lang="en-US" dirty="0"/>
+          </a:p>
+          <a:p>
+            <a:r>
+              <a:rPr lang="en-US" dirty="0"/>
+              <a:t>In a Pipeline, e.g., using </a:t>
+            </a:r>
+            <a:r>
+              <a:rPr lang="en-US" dirty="0" err="1"/>
+              <a:t>CircleCi</a:t>
+            </a:r>
+            <a:endParaRPr lang="en-US" dirty="0"/>
+          </a:p>
+          <a:p>
+            <a:r>
+              <a:rPr lang="en-US" dirty="0"/>
+              <a:t>In an IDE, e.g., using IntelliJ</a:t>
+            </a:r>
+          </a:p>
+          <a:p>
+            <a:pPr marL="0" indent="0">
+              <a:buNone/>
+            </a:pPr>
+            <a:endParaRPr lang="en-US" dirty="0"/>
+          </a:p>
+          <a:p>
+            <a:pPr marL="0" indent="0">
+              <a:buNone/>
+            </a:pPr>
+            <a:r>
+              <a:rPr lang="en-US" dirty="0"/>
+              <a:t>You only need one token.</a:t>
+            </a:r>
+            <a:endParaRPr lang="es-CO" dirty="0"/>
+          </a:p>
+        </p:txBody>
+      </p:sp>
+      <p:pic>
+        <p:nvPicPr>
+          <p:cNvPr id="4" name="Picture 2">
+            <a:extLst>
+              <a:ext uri="{FF2B5EF4-FFF2-40B4-BE49-F238E27FC236}">
+                <a16:creationId xmlns:a16="http://schemas.microsoft.com/office/drawing/2014/main" id="{A956F151-0FFB-254D-3F8D-819634221106}"/>
+              </a:ext>
+            </a:extLst>
+          </p:cNvPr>
+          <p:cNvPicPr>
+            <a:picLocks noChangeAspect="1" noChangeArrowheads="1"/>
+          </p:cNvPicPr>
+          <p:nvPr/>
+        </p:nvPicPr>
+        <p:blipFill>
+          <a:blip r:embed="rId2">
+            <a:extLst>
+              <a:ext uri="{28A0092B-C50C-407E-A947-70E740481C1C}">
+                <a14:useLocalDpi xmlns:a14="http://schemas.microsoft.com/office/drawing/2010/main" val="0"/>
+              </a:ext>
+            </a:extLst>
+          </a:blip>
+          <a:srcRect/>
+          <a:stretch>
+            <a:fillRect/>
+          </a:stretch>
+        </p:blipFill>
+        <p:spPr bwMode="auto">
+          <a:xfrm>
+            <a:off x="5350686" y="2292222"/>
+            <a:ext cx="6003114" cy="3418143"/>
+          </a:xfrm>
+          <a:prstGeom prst="rect">
+            <a:avLst/>
+          </a:prstGeom>
+          <a:noFill/>
+          <a:extLst>
+            <a:ext uri="{909E8E84-426E-40DD-AFC4-6F175D3DCCD1}">
+              <a14:hiddenFill xmlns:a14="http://schemas.microsoft.com/office/drawing/2010/main">
+                <a:solidFill>
+                  <a:srgbClr val="FFFFFF"/>
+                </a:solidFill>
+              </a14:hiddenFill>
+            </a:ext>
+          </a:extLst>
+        </p:spPr>
+      </p:pic>
+    </p:spTree>
+    <p:extLst>
+      <p:ext uri="{BB962C8B-B14F-4D97-AF65-F5344CB8AC3E}">
+        <p14:creationId xmlns:p14="http://schemas.microsoft.com/office/powerpoint/2010/main" val="3914237639"/>
+      </p:ext>
+    </p:extLst>
+  </p:cSld>
+  <p:clrMapOvr>
+    <a:masterClrMapping/>
+  </p:clrMapOvr>
+</p:sld>
+</file>
+
+<file path=ppt/slides/slide4.xml><?xml version="1.0" encoding="utf-8"?>
+<p:sld xmlns:a="http://schemas.openxmlformats.org/drawingml/2006/main" xmlns:r="http://schemas.openxmlformats.org/officeDocument/2006/relationships" xmlns:p="http://schemas.openxmlformats.org/presentationml/2006/main">
+  <p:cSld>
+    <p:spTree>
+      <p:nvGrpSpPr>
+        <p:cNvPr id="1" name=""/>
+        <p:cNvGrpSpPr/>
+        <p:nvPr/>
+      </p:nvGrpSpPr>
+      <p:grpSpPr>
+        <a:xfrm>
+          <a:off x="0" y="0"/>
+          <a:ext cx="0" cy="0"/>
+          <a:chOff x="0" y="0"/>
+          <a:chExt cx="0" cy="0"/>
+        </a:xfrm>
+      </p:grpSpPr>
+      <p:sp>
+        <p:nvSpPr>
+          <p:cNvPr id="2" name="Título 1">
+            <a:extLst>
+              <a:ext uri="{FF2B5EF4-FFF2-40B4-BE49-F238E27FC236}">
+                <a16:creationId xmlns:a16="http://schemas.microsoft.com/office/drawing/2014/main" id="{B3DD1268-ED85-870E-AB3B-07CE90AF727D}"/>
+              </a:ext>
+            </a:extLst>
+          </p:cNvPr>
+          <p:cNvSpPr>
+            <a:spLocks noGrp="1"/>
+          </p:cNvSpPr>
+          <p:nvPr>
+            <p:ph type="title"/>
+          </p:nvPr>
+        </p:nvSpPr>
+        <p:spPr/>
+        <p:txBody>
+          <a:bodyPr/>
+          <a:lstStyle/>
+          <a:p>
+            <a:r>
+              <a:rPr lang="en-US" dirty="0"/>
+              <a:t>How does it work?</a:t>
+            </a:r>
+            <a:endParaRPr lang="es-CO" dirty="0"/>
+          </a:p>
+        </p:txBody>
+      </p:sp>
+      <p:sp>
+        <p:nvSpPr>
+          <p:cNvPr id="3" name="Marcador de contenido 2">
+            <a:extLst>
+              <a:ext uri="{FF2B5EF4-FFF2-40B4-BE49-F238E27FC236}">
+                <a16:creationId xmlns:a16="http://schemas.microsoft.com/office/drawing/2014/main" id="{2AA23472-B79A-737C-903D-F8CE1367D066}"/>
+              </a:ext>
+            </a:extLst>
+          </p:cNvPr>
+          <p:cNvSpPr>
+            <a:spLocks noGrp="1"/>
+          </p:cNvSpPr>
+          <p:nvPr>
+            <p:ph idx="1"/>
+          </p:nvPr>
+        </p:nvSpPr>
+        <p:spPr/>
+        <p:txBody>
+          <a:bodyPr>
+            <a:normAutofit/>
+          </a:bodyPr>
+          <a:lstStyle/>
+          <a:p>
+            <a:r>
+              <a:rPr lang="en-US" dirty="0"/>
+              <a:t>A Sonar project is related to a code project regardless of being in the same repository</a:t>
+            </a:r>
+          </a:p>
+          <a:p>
+            <a:r>
+              <a:rPr lang="en-US" dirty="0"/>
+              <a:t>You can configure exclusions in a property file in the code project or in the Sonar project </a:t>
+            </a:r>
+          </a:p>
+          <a:p>
+            <a:r>
+              <a:rPr lang="en-US" dirty="0"/>
+              <a:t>You can use scanners other than Sonar*</a:t>
+            </a:r>
+          </a:p>
+          <a:p>
+            <a:endParaRPr lang="en-US" dirty="0"/>
+          </a:p>
+          <a:p>
+            <a:pPr marL="0" indent="0">
+              <a:buNone/>
+            </a:pPr>
+            <a:r>
+              <a:rPr lang="es-CO" dirty="0"/>
+              <a:t>https://docs.sonarsource.com/sonarqube/latest/analyzing-source-code/importing-external-issues/importing-third-party-issues/</a:t>
+            </a:r>
+          </a:p>
+        </p:txBody>
+      </p:sp>
+    </p:spTree>
+    <p:extLst>
+      <p:ext uri="{BB962C8B-B14F-4D97-AF65-F5344CB8AC3E}">
+        <p14:creationId xmlns:p14="http://schemas.microsoft.com/office/powerpoint/2010/main" val="418650597"/>
+      </p:ext>
+    </p:extLst>
+  </p:cSld>
+  <p:clrMapOvr>
+    <a:masterClrMapping/>
+  </p:clrMapOvr>
+</p:sld>
+</file>
+
+<file path=ppt/slides/slide5.xml><?xml version="1.0" encoding="utf-8"?>
+<p:sld xmlns:a="http://schemas.openxmlformats.org/drawingml/2006/main" xmlns:r="http://schemas.openxmlformats.org/officeDocument/2006/relationships" xmlns:p="http://schemas.openxmlformats.org/presentationml/2006/main">
+  <p:cSld>
+    <p:spTree>
+      <p:nvGrpSpPr>
+        <p:cNvPr id="1" name=""/>
+        <p:cNvGrpSpPr/>
+        <p:nvPr/>
+      </p:nvGrpSpPr>
+      <p:grpSpPr>
+        <a:xfrm>
+          <a:off x="0" y="0"/>
+          <a:ext cx="0" cy="0"/>
+          <a:chOff x="0" y="0"/>
+          <a:chExt cx="0" cy="0"/>
+        </a:xfrm>
+      </p:grpSpPr>
+      <p:sp>
+        <p:nvSpPr>
+          <p:cNvPr id="2" name="Título 1">
+            <a:extLst>
+              <a:ext uri="{FF2B5EF4-FFF2-40B4-BE49-F238E27FC236}">
+                <a16:creationId xmlns:a16="http://schemas.microsoft.com/office/drawing/2014/main" id="{76F76B15-BACF-5815-9D71-CED31090FA4C}"/>
+              </a:ext>
+            </a:extLst>
+          </p:cNvPr>
+          <p:cNvSpPr>
+            <a:spLocks noGrp="1"/>
+          </p:cNvSpPr>
+          <p:nvPr>
+            <p:ph type="title"/>
+          </p:nvPr>
+        </p:nvSpPr>
+        <p:spPr/>
+        <p:txBody>
+          <a:bodyPr/>
+          <a:lstStyle/>
+          <a:p>
+            <a:r>
+              <a:rPr lang="en-US" dirty="0"/>
+              <a:t>Where can I find the rules?</a:t>
+            </a:r>
+            <a:endParaRPr lang="es-CO" dirty="0"/>
+          </a:p>
+        </p:txBody>
+      </p:sp>
+      <p:sp>
+        <p:nvSpPr>
+          <p:cNvPr id="3" name="Marcador de contenido 2">
+            <a:extLst>
+              <a:ext uri="{FF2B5EF4-FFF2-40B4-BE49-F238E27FC236}">
+                <a16:creationId xmlns:a16="http://schemas.microsoft.com/office/drawing/2014/main" id="{1F760525-FA2B-0F10-8A7E-F4ECB26B5164}"/>
+              </a:ext>
+            </a:extLst>
+          </p:cNvPr>
+          <p:cNvSpPr>
+            <a:spLocks noGrp="1"/>
+          </p:cNvSpPr>
+          <p:nvPr>
+            <p:ph idx="1"/>
+          </p:nvPr>
+        </p:nvSpPr>
+        <p:spPr>
+          <a:xfrm>
+            <a:off x="838200" y="1825625"/>
+            <a:ext cx="10515600" cy="1752844"/>
+          </a:xfrm>
+        </p:spPr>
+        <p:txBody>
+          <a:bodyPr/>
+          <a:lstStyle/>
+          <a:p>
+            <a:r>
+              <a:rPr lang="es-CO" dirty="0">
+                <a:hlinkClick r:id="rId2"/>
+              </a:rPr>
+              <a:t>https://rules.sonarsource.com/</a:t>
+            </a:r>
+            <a:endParaRPr lang="es-CO" dirty="0"/>
+          </a:p>
+        </p:txBody>
+      </p:sp>
+      <p:sp>
+        <p:nvSpPr>
+          <p:cNvPr id="5" name="Título 1">
+            <a:extLst>
+              <a:ext uri="{FF2B5EF4-FFF2-40B4-BE49-F238E27FC236}">
+                <a16:creationId xmlns:a16="http://schemas.microsoft.com/office/drawing/2014/main" id="{4081B0D2-9208-5B61-B70B-34086F2FC259}"/>
+              </a:ext>
+            </a:extLst>
+          </p:cNvPr>
+          <p:cNvSpPr txBox="1">
+            <a:spLocks/>
+          </p:cNvSpPr>
+          <p:nvPr/>
+        </p:nvSpPr>
+        <p:spPr>
+          <a:xfrm>
+            <a:off x="838200" y="3207971"/>
+            <a:ext cx="10515600" cy="1325563"/>
+          </a:xfrm>
+          <a:prstGeom prst="rect">
+            <a:avLst/>
+          </a:prstGeom>
+        </p:spPr>
+        <p:txBody>
+          <a:bodyPr vert="horz" lIns="91440" tIns="45720" rIns="91440" bIns="45720" rtlCol="0" anchor="ctr">
+            <a:normAutofit/>
+          </a:bodyPr>
+          <a:lstStyle>
+            <a:lvl1pPr algn="l" defTabSz="914400" rtl="0" eaLnBrk="1" latinLnBrk="0" hangingPunct="1">
+              <a:lnSpc>
+                <a:spcPct val="90000"/>
+              </a:lnSpc>
+              <a:spcBef>
+                <a:spcPct val="0"/>
+              </a:spcBef>
+              <a:buNone/>
+              <a:defRPr sz="4400" kern="1200">
+                <a:solidFill>
+                  <a:schemeClr val="tx1"/>
+                </a:solidFill>
+                <a:latin typeface="+mj-lt"/>
+                <a:ea typeface="+mj-ea"/>
+                <a:cs typeface="+mj-cs"/>
+              </a:defRPr>
+            </a:lvl1pPr>
+          </a:lstStyle>
+          <a:p>
+            <a:r>
+              <a:rPr lang="en-US" dirty="0"/>
+              <a:t>Where can I find the properties?</a:t>
+            </a:r>
+            <a:endParaRPr lang="es-CO" dirty="0"/>
+          </a:p>
+        </p:txBody>
+      </p:sp>
+      <p:sp>
+        <p:nvSpPr>
+          <p:cNvPr id="6" name="Marcador de contenido 2">
+            <a:extLst>
+              <a:ext uri="{FF2B5EF4-FFF2-40B4-BE49-F238E27FC236}">
+                <a16:creationId xmlns:a16="http://schemas.microsoft.com/office/drawing/2014/main" id="{9621E424-D39F-BD6D-69E0-C4111CA6AC23}"/>
+              </a:ext>
+            </a:extLst>
+          </p:cNvPr>
+          <p:cNvSpPr txBox="1">
+            <a:spLocks/>
+          </p:cNvSpPr>
+          <p:nvPr/>
+        </p:nvSpPr>
+        <p:spPr>
+          <a:xfrm>
+            <a:off x="838200" y="4668471"/>
+            <a:ext cx="10515600" cy="1752844"/>
+          </a:xfrm>
+          <a:prstGeom prst="rect">
+            <a:avLst/>
+          </a:prstGeom>
+        </p:spPr>
+        <p:txBody>
+          <a:bodyPr vert="horz" lIns="91440" tIns="45720" rIns="91440" bIns="45720" rtlCol="0">
+            <a:normAutofit/>
+          </a:bodyPr>
+          <a:lstStyle>
+            <a:lvl1pPr marL="228600" indent="-228600" algn="l" defTabSz="914400" rtl="0" eaLnBrk="1" latinLnBrk="0" hangingPunct="1">
+              <a:lnSpc>
+                <a:spcPct val="90000"/>
+              </a:lnSpc>
+              <a:spcBef>
+                <a:spcPts val="1000"/>
+              </a:spcBef>
+              <a:buFont typeface="Arial" panose="020B0604020202020204" pitchFamily="34" charset="0"/>
+              <a:buChar char="•"/>
+              <a:defRPr sz="2800" kern="1200">
+                <a:solidFill>
+                  <a:schemeClr val="tx1"/>
+                </a:solidFill>
+                <a:latin typeface="+mn-lt"/>
+                <a:ea typeface="+mn-ea"/>
+                <a:cs typeface="+mn-cs"/>
+              </a:defRPr>
+            </a:lvl1pPr>
+            <a:lvl2pPr marL="685800" indent="-228600" algn="l" defTabSz="914400" rtl="0" eaLnBrk="1" latinLnBrk="0" hangingPunct="1">
+              <a:lnSpc>
+                <a:spcPct val="90000"/>
+              </a:lnSpc>
+              <a:spcBef>
+                <a:spcPts val="500"/>
+              </a:spcBef>
+              <a:buFont typeface="Arial" panose="020B0604020202020204" pitchFamily="34" charset="0"/>
+              <a:buChar char="•"/>
+              <a:defRPr sz="2400" kern="1200">
+                <a:solidFill>
+                  <a:schemeClr val="tx1"/>
+                </a:solidFill>
+                <a:latin typeface="+mn-lt"/>
+                <a:ea typeface="+mn-ea"/>
+                <a:cs typeface="+mn-cs"/>
+              </a:defRPr>
+            </a:lvl2pPr>
+            <a:lvl3pPr marL="1143000" indent="-228600" algn="l" defTabSz="914400" rtl="0" eaLnBrk="1" latinLnBrk="0" hangingPunct="1">
+              <a:lnSpc>
+                <a:spcPct val="90000"/>
+              </a:lnSpc>
+              <a:spcBef>
+                <a:spcPts val="500"/>
+              </a:spcBef>
+              <a:buFont typeface="Arial" panose="020B0604020202020204" pitchFamily="34" charset="0"/>
+              <a:buChar char="•"/>
+              <a:defRPr sz="2000" kern="1200">
+                <a:solidFill>
+                  <a:schemeClr val="tx1"/>
+                </a:solidFill>
+                <a:latin typeface="+mn-lt"/>
+                <a:ea typeface="+mn-ea"/>
+                <a:cs typeface="+mn-cs"/>
+              </a:defRPr>
+            </a:lvl3pPr>
+            <a:lvl4pPr marL="1600200" indent="-228600" algn="l" defTabSz="914400" rtl="0" eaLnBrk="1" latinLnBrk="0" hangingPunct="1">
+              <a:lnSpc>
+                <a:spcPct val="90000"/>
+              </a:lnSpc>
+              <a:spcBef>
+                <a:spcPts val="500"/>
+              </a:spcBef>
+              <a:buFont typeface="Arial" panose="020B0604020202020204" pitchFamily="34" charset="0"/>
+              <a:buChar char="•"/>
+              <a:defRPr sz="1800" kern="1200">
+                <a:solidFill>
+                  <a:schemeClr val="tx1"/>
+                </a:solidFill>
+                <a:latin typeface="+mn-lt"/>
+                <a:ea typeface="+mn-ea"/>
+                <a:cs typeface="+mn-cs"/>
+              </a:defRPr>
+            </a:lvl4pPr>
+            <a:lvl5pPr marL="2057400" indent="-228600" algn="l" defTabSz="914400" rtl="0" eaLnBrk="1" latinLnBrk="0" hangingPunct="1">
+              <a:lnSpc>
+                <a:spcPct val="90000"/>
+              </a:lnSpc>
+              <a:spcBef>
+                <a:spcPts val="500"/>
+              </a:spcBef>
+              <a:buFont typeface="Arial" panose="020B0604020202020204" pitchFamily="34" charset="0"/>
+              <a:buChar char="•"/>
+              <a:defRPr sz="1800" kern="1200">
+                <a:solidFill>
+                  <a:schemeClr val="tx1"/>
+                </a:solidFill>
+                <a:latin typeface="+mn-lt"/>
+                <a:ea typeface="+mn-ea"/>
+                <a:cs typeface="+mn-cs"/>
+              </a:defRPr>
+            </a:lvl5pPr>
+            <a:lvl6pPr marL="2514600" indent="-228600" algn="l" defTabSz="914400" rtl="0" eaLnBrk="1" latinLnBrk="0" hangingPunct="1">
+              <a:lnSpc>
+                <a:spcPct val="90000"/>
+              </a:lnSpc>
+              <a:spcBef>
+                <a:spcPts val="500"/>
+              </a:spcBef>
+              <a:buFont typeface="Arial" panose="020B0604020202020204" pitchFamily="34" charset="0"/>
+              <a:buChar char="•"/>
+              <a:defRPr sz="1800" kern="1200">
+                <a:solidFill>
+                  <a:schemeClr val="tx1"/>
+                </a:solidFill>
+                <a:latin typeface="+mn-lt"/>
+                <a:ea typeface="+mn-ea"/>
+                <a:cs typeface="+mn-cs"/>
+              </a:defRPr>
+            </a:lvl6pPr>
+            <a:lvl7pPr marL="2971800" indent="-228600" algn="l" defTabSz="914400" rtl="0" eaLnBrk="1" latinLnBrk="0" hangingPunct="1">
+              <a:lnSpc>
+                <a:spcPct val="90000"/>
+              </a:lnSpc>
+              <a:spcBef>
+                <a:spcPts val="500"/>
+              </a:spcBef>
+              <a:buFont typeface="Arial" panose="020B0604020202020204" pitchFamily="34" charset="0"/>
+              <a:buChar char="•"/>
+              <a:defRPr sz="1800" kern="1200">
+                <a:solidFill>
+                  <a:schemeClr val="tx1"/>
+                </a:solidFill>
+                <a:latin typeface="+mn-lt"/>
+                <a:ea typeface="+mn-ea"/>
+                <a:cs typeface="+mn-cs"/>
+              </a:defRPr>
+            </a:lvl7pPr>
+            <a:lvl8pPr marL="3429000" indent="-228600" algn="l" defTabSz="914400" rtl="0" eaLnBrk="1" latinLnBrk="0" hangingPunct="1">
+              <a:lnSpc>
+                <a:spcPct val="90000"/>
+              </a:lnSpc>
+              <a:spcBef>
+                <a:spcPts val="500"/>
+              </a:spcBef>
+              <a:buFont typeface="Arial" panose="020B0604020202020204" pitchFamily="34" charset="0"/>
+              <a:buChar char="•"/>
+              <a:defRPr sz="1800" kern="1200">
+                <a:solidFill>
+                  <a:schemeClr val="tx1"/>
+                </a:solidFill>
+                <a:latin typeface="+mn-lt"/>
+                <a:ea typeface="+mn-ea"/>
+                <a:cs typeface="+mn-cs"/>
+              </a:defRPr>
+            </a:lvl8pPr>
+            <a:lvl9pPr marL="3886200" indent="-228600" algn="l" defTabSz="914400" rtl="0" eaLnBrk="1" latinLnBrk="0" hangingPunct="1">
+              <a:lnSpc>
+                <a:spcPct val="90000"/>
+              </a:lnSpc>
+              <a:spcBef>
+                <a:spcPts val="500"/>
+              </a:spcBef>
+              <a:buFont typeface="Arial" panose="020B0604020202020204" pitchFamily="34" charset="0"/>
+              <a:buChar char="•"/>
+              <a:defRPr sz="1800" kern="1200">
+                <a:solidFill>
+                  <a:schemeClr val="tx1"/>
+                </a:solidFill>
+                <a:latin typeface="+mn-lt"/>
+                <a:ea typeface="+mn-ea"/>
+                <a:cs typeface="+mn-cs"/>
+              </a:defRPr>
+            </a:lvl9pPr>
+          </a:lstStyle>
+          <a:p>
+            <a:r>
+              <a:rPr lang="es-CO" dirty="0">
+                <a:hlinkClick r:id="rId3"/>
+              </a:rPr>
+              <a:t>https://docs.sonarsource.com/sonarqube/latest/analyzing-source-code/analysis-parameters/</a:t>
+            </a:r>
+            <a:endParaRPr lang="es-CO" dirty="0"/>
+          </a:p>
+          <a:p>
+            <a:endParaRPr lang="es-CO" dirty="0"/>
+          </a:p>
+        </p:txBody>
+      </p:sp>
+    </p:spTree>
+    <p:extLst>
+      <p:ext uri="{BB962C8B-B14F-4D97-AF65-F5344CB8AC3E}">
+        <p14:creationId xmlns:p14="http://schemas.microsoft.com/office/powerpoint/2010/main" val="213167589"/>
+      </p:ext>
+    </p:extLst>
+  </p:cSld>
+  <p:clrMapOvr>
+    <a:masterClrMapping/>
+  </p:clrMapOvr>
+</p:sld>
+</file>
+
+<file path=ppt/slides/slide6.xml><?xml version="1.0" encoding="utf-8"?>
+<p:sld xmlns:a="http://schemas.openxmlformats.org/drawingml/2006/main" xmlns:r="http://schemas.openxmlformats.org/officeDocument/2006/relationships" xmlns:p="http://schemas.openxmlformats.org/presentationml/2006/main">
+  <p:cSld>
+    <p:spTree>
+      <p:nvGrpSpPr>
+        <p:cNvPr id="1" name=""/>
+        <p:cNvGrpSpPr/>
+        <p:nvPr/>
+      </p:nvGrpSpPr>
+      <p:grpSpPr>
+        <a:xfrm>
+          <a:off x="0" y="0"/>
+          <a:ext cx="0" cy="0"/>
+          <a:chOff x="0" y="0"/>
+          <a:chExt cx="0" cy="0"/>
+        </a:xfrm>
+      </p:grpSpPr>
+      <p:sp>
+        <p:nvSpPr>
+          <p:cNvPr id="2" name="Título 1">
+            <a:extLst>
+              <a:ext uri="{FF2B5EF4-FFF2-40B4-BE49-F238E27FC236}">
+                <a16:creationId xmlns:a16="http://schemas.microsoft.com/office/drawing/2014/main" id="{8D5B5A7A-9211-BE97-D348-E192D0970B57}"/>
+              </a:ext>
+            </a:extLst>
+          </p:cNvPr>
+          <p:cNvSpPr>
+            <a:spLocks noGrp="1"/>
+          </p:cNvSpPr>
+          <p:nvPr>
+            <p:ph type="title"/>
+          </p:nvPr>
+        </p:nvSpPr>
+        <p:spPr/>
+        <p:txBody>
+          <a:bodyPr/>
+          <a:lstStyle/>
+          <a:p>
+            <a:r>
+              <a:rPr lang="en-US" dirty="0"/>
+              <a:t>Example</a:t>
+            </a:r>
+            <a:endParaRPr lang="es-CO" dirty="0"/>
+          </a:p>
+        </p:txBody>
+      </p:sp>
+      <p:sp>
+        <p:nvSpPr>
+          <p:cNvPr id="3" name="Marcador de contenido 2">
+            <a:extLst>
+              <a:ext uri="{FF2B5EF4-FFF2-40B4-BE49-F238E27FC236}">
+                <a16:creationId xmlns:a16="http://schemas.microsoft.com/office/drawing/2014/main" id="{80AC9390-51CB-A93A-0BD8-45CA8A2D98BC}"/>
+              </a:ext>
+            </a:extLst>
+          </p:cNvPr>
+          <p:cNvSpPr>
+            <a:spLocks noGrp="1"/>
+          </p:cNvSpPr>
+          <p:nvPr>
+            <p:ph idx="1"/>
+          </p:nvPr>
+        </p:nvSpPr>
+        <p:spPr/>
+        <p:txBody>
+          <a:bodyPr/>
+          <a:lstStyle/>
+          <a:p>
+            <a:pPr marL="0" indent="0">
+              <a:buNone/>
+            </a:pPr>
+            <a:r>
+              <a:rPr lang="es-CO" dirty="0" err="1"/>
+              <a:t>Github</a:t>
+            </a:r>
+            <a:endParaRPr lang="es-CO" dirty="0"/>
+          </a:p>
+          <a:p>
+            <a:pPr marL="0" indent="0">
+              <a:buNone/>
+            </a:pPr>
+            <a:r>
+              <a:rPr lang="es-CO" dirty="0">
+                <a:hlinkClick r:id="rId2"/>
+              </a:rPr>
+              <a:t>https://github.com/crcaguilerapo/static-analysis/pull/3</a:t>
+            </a:r>
+            <a:endParaRPr lang="es-CO" dirty="0"/>
+          </a:p>
+          <a:p>
+            <a:pPr marL="0" indent="0">
+              <a:buNone/>
+            </a:pPr>
+            <a:endParaRPr lang="es-CO" dirty="0"/>
+          </a:p>
+          <a:p>
+            <a:pPr marL="0" indent="0">
+              <a:buNone/>
+            </a:pPr>
+            <a:r>
+              <a:rPr lang="es-CO" dirty="0" err="1"/>
+              <a:t>CircleCI</a:t>
+            </a:r>
+            <a:endParaRPr lang="es-CO" dirty="0"/>
+          </a:p>
+          <a:p>
+            <a:pPr marL="0" indent="0">
+              <a:buNone/>
+            </a:pPr>
+            <a:r>
+              <a:rPr lang="es-CO" dirty="0">
+                <a:hlinkClick r:id="rId3"/>
+              </a:rPr>
+              <a:t>https://app.circleci.com/pipelines/github/crcaguilerapo/static-analysis</a:t>
+            </a:r>
+            <a:endParaRPr lang="es-CO" dirty="0"/>
+          </a:p>
+          <a:p>
+            <a:pPr marL="0" indent="0">
+              <a:buNone/>
+            </a:pPr>
+            <a:endParaRPr lang="es-CO" dirty="0"/>
+          </a:p>
+          <a:p>
+            <a:pPr marL="0" indent="0">
+              <a:buNone/>
+            </a:pPr>
+            <a:r>
+              <a:rPr lang="es-CO" dirty="0" err="1"/>
+              <a:t>SonarCloud</a:t>
+            </a:r>
+            <a:endParaRPr lang="es-CO" dirty="0"/>
+          </a:p>
+          <a:p>
+            <a:pPr marL="0" indent="0">
+              <a:buNone/>
+            </a:pPr>
+            <a:r>
+              <a:rPr lang="es-CO" dirty="0">
+                <a:hlinkClick r:id="rId4"/>
+              </a:rPr>
+              <a:t>https://sonarcloud.io/projects</a:t>
+            </a:r>
+            <a:endParaRPr lang="es-CO" dirty="0"/>
+          </a:p>
+          <a:p>
+            <a:pPr marL="0" indent="0">
+              <a:buNone/>
+            </a:pPr>
+            <a:endParaRPr lang="es-CO" dirty="0"/>
+          </a:p>
+        </p:txBody>
+      </p:sp>
+    </p:spTree>
+    <p:extLst>
+      <p:ext uri="{BB962C8B-B14F-4D97-AF65-F5344CB8AC3E}">
+        <p14:creationId xmlns:p14="http://schemas.microsoft.com/office/powerpoint/2010/main" val="2377543327"/>
+      </p:ext>
+    </p:extLst>
+  </p:cSld>
+  <p:clrMapOvr>
+    <a:masterClrMapping/>
+  </p:clrMapOvr>
+</p:sld>
+</file>
+
+<file path=ppt/slides/slide7.xml><?xml version="1.0" encoding="utf-8"?>
+<p:sld xmlns:a="http://schemas.openxmlformats.org/drawingml/2006/main" xmlns:r="http://schemas.openxmlformats.org/officeDocument/2006/relationships" xmlns:p="http://schemas.openxmlformats.org/presentationml/2006/main">
+  <p:cSld>
+    <p:spTree>
+      <p:nvGrpSpPr>
+        <p:cNvPr id="1" name=""/>
+        <p:cNvGrpSpPr/>
+        <p:nvPr/>
+      </p:nvGrpSpPr>
+      <p:grpSpPr>
+        <a:xfrm>
+          <a:off x="0" y="0"/>
+          <a:ext cx="0" cy="0"/>
+          <a:chOff x="0" y="0"/>
+          <a:chExt cx="0" cy="0"/>
+        </a:xfrm>
+      </p:grpSpPr>
+      <p:sp>
+        <p:nvSpPr>
+          <p:cNvPr id="2" name="Título 1">
+            <a:extLst>
+              <a:ext uri="{FF2B5EF4-FFF2-40B4-BE49-F238E27FC236}">
+                <a16:creationId xmlns:a16="http://schemas.microsoft.com/office/drawing/2014/main" id="{1FAFFF37-9A57-49BD-947E-93BFE2D098F8}"/>
+              </a:ext>
+            </a:extLst>
+          </p:cNvPr>
+          <p:cNvSpPr>
+            <a:spLocks noGrp="1"/>
+          </p:cNvSpPr>
+          <p:nvPr>
+            <p:ph type="title"/>
+          </p:nvPr>
+        </p:nvSpPr>
+        <p:spPr/>
+        <p:txBody>
+          <a:bodyPr/>
+          <a:lstStyle/>
+          <a:p>
+            <a:r>
+              <a:rPr lang="en-US" dirty="0"/>
+              <a:t>References</a:t>
+            </a:r>
+            <a:endParaRPr lang="es-CO" dirty="0"/>
+          </a:p>
+        </p:txBody>
+      </p:sp>
+      <p:sp>
+        <p:nvSpPr>
+          <p:cNvPr id="3" name="Marcador de contenido 2">
+            <a:extLst>
+              <a:ext uri="{FF2B5EF4-FFF2-40B4-BE49-F238E27FC236}">
+                <a16:creationId xmlns:a16="http://schemas.microsoft.com/office/drawing/2014/main" id="{3068D487-A3E6-B478-E6C0-168E1328969E}"/>
+              </a:ext>
+            </a:extLst>
+          </p:cNvPr>
+          <p:cNvSpPr>
+            <a:spLocks noGrp="1"/>
+          </p:cNvSpPr>
+          <p:nvPr>
+            <p:ph idx="1"/>
+          </p:nvPr>
+        </p:nvSpPr>
+        <p:spPr/>
+        <p:txBody>
+          <a:bodyPr/>
+          <a:lstStyle/>
+          <a:p>
+            <a:r>
+              <a:rPr lang="es-CO" dirty="0">
+                <a:hlinkClick r:id="rId2"/>
+              </a:rPr>
+              <a:t>https://docs.sonarsource.com/sonarlint/intellij/</a:t>
+            </a:r>
+            <a:endParaRPr lang="es-CO" dirty="0"/>
+          </a:p>
+          <a:p>
+            <a:r>
+              <a:rPr lang="es-CO" dirty="0">
+                <a:hlinkClick r:id="rId3"/>
+              </a:rPr>
+              <a:t>https://docs.sonarsource.com/sonarqube/latest/</a:t>
+            </a:r>
+            <a:endParaRPr lang="es-CO" dirty="0"/>
+          </a:p>
+          <a:p>
+            <a:endParaRPr lang="es-CO" dirty="0"/>
+          </a:p>
+        </p:txBody>
+      </p:sp>
+    </p:spTree>
+    <p:extLst>
+      <p:ext uri="{BB962C8B-B14F-4D97-AF65-F5344CB8AC3E}">
+        <p14:creationId xmlns:p14="http://schemas.microsoft.com/office/powerpoint/2010/main" val="234021067"/>
       </p:ext>
     </p:extLst>
   </p:cSld>

</xml_diff>